<commit_message>
added themeConfig for theme, styleConfig for each component
</commit_message>
<xml_diff>
--- a/SamplePresentation.pptx
+++ b/SamplePresentation.pptx
@@ -972,14 +972,14 @@
         </p:nvSpPr>
         <p:spPr>
           <a:xfrm>
-            <a:off x="457200" y="228600"/>
-            <a:ext cx="5486400" cy="1371600"/>
+            <a:off x="0" y="0"/>
+            <a:ext cx="6858000" cy="0"/>
           </a:xfrm>
           <a:prstGeom prst="rect">
             <a:avLst/>
           </a:prstGeom>
           <a:solidFill>
-            <a:srgbClr val="305597"/>
+            <a:srgbClr val="FFFFFF"/>
           </a:solidFill>
           <a:ln/>
         </p:spPr>
@@ -987,21 +987,21 @@
           <a:bodyPr wrap="square" rtlCol="0" anchor="ctr"/>
           <a:lstStyle/>
           <a:p>
-            <a:pPr algn="ctr" indent="0" marL="0">
+            <a:pPr indent="0" marL="0">
               <a:buNone/>
             </a:pPr>
             <a:r>
-              <a:rPr lang="en-US" sz="4800" b="1" dirty="0">
+              <a:rPr lang="en-US" dirty="0">
                 <a:solidFill>
-                  <a:srgbClr val="FFFFFF"/>
+                  <a:srgbClr val="305597"/>
                 </a:solidFill>
-                <a:latin typeface="Arial" pitchFamily="34" charset="0"/>
-                <a:ea typeface="Arial" pitchFamily="34" charset="-122"/>
-                <a:cs typeface="Arial" pitchFamily="34" charset="-120"/>
+                <a:latin typeface="Roboto" pitchFamily="34" charset="0"/>
+                <a:ea typeface="Roboto" pitchFamily="34" charset="-122"/>
+                <a:cs typeface="Roboto" pitchFamily="34" charset="-120"/>
               </a:rPr>
               <a:t>Welcome to Our Presentation!</a:t>
             </a:r>
-            <a:endParaRPr lang="en-US" sz="4800" dirty="0"/>
+            <a:endParaRPr lang="en-US" dirty="0"/>
           </a:p>
         </p:txBody>
       </p:sp>
@@ -1038,14 +1038,14 @@
         </p:nvSpPr>
         <p:spPr>
           <a:xfrm>
-            <a:off x="457200" y="1600200"/>
-            <a:ext cx="5486400" cy="457200"/>
+            <a:off x="0" y="0"/>
+            <a:ext cx="6858000" cy="0"/>
           </a:xfrm>
           <a:prstGeom prst="rect">
             <a:avLst/>
           </a:prstGeom>
           <a:solidFill>
-            <a:srgbClr val="000000"/>
+            <a:srgbClr val="FFFFFF"/>
           </a:solidFill>
           <a:ln/>
         </p:spPr>
@@ -1053,21 +1053,21 @@
           <a:bodyPr wrap="square" rtlCol="0" anchor="ctr"/>
           <a:lstStyle/>
           <a:p>
-            <a:pPr algn="l" indent="0" marL="0">
+            <a:pPr indent="0" marL="0">
               <a:buNone/>
             </a:pPr>
             <a:r>
-              <a:rPr lang="en-US" sz="3200" b="1" dirty="0">
+              <a:rPr lang="en-US" dirty="0">
                 <a:solidFill>
                   <a:srgbClr val="305597"/>
                 </a:solidFill>
-                <a:latin typeface="Arial" pitchFamily="34" charset="0"/>
-                <a:ea typeface="Arial" pitchFamily="34" charset="-122"/>
-                <a:cs typeface="Arial" pitchFamily="34" charset="-120"/>
+                <a:latin typeface="Roboto" pitchFamily="34" charset="0"/>
+                <a:ea typeface="Roboto" pitchFamily="34" charset="-122"/>
+                <a:cs typeface="Roboto" pitchFamily="34" charset="-120"/>
               </a:rPr>
               <a:t>First Heading</a:t>
             </a:r>
-            <a:endParaRPr lang="en-US" sz="3200" dirty="0"/>
+            <a:endParaRPr lang="en-US" dirty="0"/>
           </a:p>
         </p:txBody>
       </p:sp>

</xml_diff>

<commit_message>
add text, subtitle cpn, add new slide layout
</commit_message>
<xml_diff>
--- a/SamplePresentation.pptx
+++ b/SamplePresentation.pptx
@@ -5,13 +5,11 @@
     <p:sldMasterId id="2147483648" r:id="rId1"/>
   </p:sldMasterIdLst>
   <p:notesMasterIdLst>
-    <p:notesMasterId r:id="rId6"/>
+    <p:notesMasterId r:id="rId4"/>
   </p:notesMasterIdLst>
   <p:sldIdLst>
     <p:sldId id="256" r:id="rId2"/>
-    <p:sldId id="259" r:id="rId3"/>
-    <p:sldId id="258" r:id="rId4"/>
-    <p:sldId id="257" r:id="rId5"/>
+    <p:sldId id="257" r:id="rId3"/>
   </p:sldIdLst>
   <p:sldSz cx="9144000" cy="5143500" type="screen16x9"/>
   <p:notesSz cx="5143500" cy="9144000"/>
@@ -140,7 +138,7 @@
     </p:spTree>
     <p:extLst>
       <p:ext uri="{BB962C8B-B14F-4D97-AF65-F5344CB8AC3E}">
-        <p14:creationId xmlns:p14="http://schemas.microsoft.com/office/powerpoint/2010/main" val="3371536403"/>
+        <p14:creationId xmlns:p14="http://schemas.microsoft.com/office/powerpoint/2010/main" val="497970229"/>
       </p:ext>
     </p:extLst>
   </p:cSld>
@@ -389,7 +387,7 @@
           <a:p>
             <a:fld id="{F7021451-1387-4CA6-816F-3879F97B5CBC}" type="slidenum">
               <a:rPr lang="en-US"/>
-              <a:t>4</a:t>
+              <a:t>2</a:t>
             </a:fld>
             <a:endParaRPr lang="en-US"/>
           </a:p>
@@ -747,14 +745,41 @@
       </p:grpSpPr>
       <p:sp>
         <p:nvSpPr>
-          <p:cNvPr id="2" name="Text 0"/>
+          <p:cNvPr id="2" name="Shape 0"/>
           <p:cNvSpPr/>
           <p:nvPr/>
         </p:nvSpPr>
         <p:spPr>
           <a:xfrm>
-            <a:off x="2192785" y="1657350"/>
-            <a:ext cx="4572000" cy="1828800"/>
+            <a:off x="0" y="0"/>
+            <a:ext cx="162000" cy="5144400"/>
+          </a:xfrm>
+          <a:prstGeom prst="rect">
+            <a:avLst/>
+          </a:prstGeom>
+          <a:solidFill>
+            <a:srgbClr val="FFFFFF"/>
+          </a:solidFill>
+          <a:ln/>
+        </p:spPr>
+        <p:txBody>
+          <a:bodyPr/>
+          <a:lstStyle/>
+          <a:p>
+            <a:endParaRPr lang="en-VN"/>
+          </a:p>
+        </p:txBody>
+      </p:sp>
+      <p:sp>
+        <p:nvSpPr>
+          <p:cNvPr id="3" name="Text 1"/>
+          <p:cNvSpPr/>
+          <p:nvPr/>
+        </p:nvSpPr>
+        <p:spPr>
+          <a:xfrm>
+            <a:off x="622800" y="2253600"/>
+            <a:ext cx="5760000" cy="1620000"/>
           </a:xfrm>
           <a:prstGeom prst="rect">
             <a:avLst/>
@@ -766,7 +791,7 @@
           <a:bodyPr wrap="square" rtlCol="0" anchor="ctr"/>
           <a:lstStyle/>
           <a:p>
-            <a:pPr marL="0" indent="0" algn="ctr">
+            <a:pPr marL="0" indent="0" algn="l">
               <a:buNone/>
             </a:pPr>
             <a:r>
@@ -784,6 +809,45 @@
           </a:p>
         </p:txBody>
       </p:sp>
+      <p:sp>
+        <p:nvSpPr>
+          <p:cNvPr id="4" name="Text 2"/>
+          <p:cNvSpPr/>
+          <p:nvPr/>
+        </p:nvSpPr>
+        <p:spPr>
+          <a:xfrm>
+            <a:off x="622800" y="3628800"/>
+            <a:ext cx="7920000" cy="648000"/>
+          </a:xfrm>
+          <a:prstGeom prst="rect">
+            <a:avLst/>
+          </a:prstGeom>
+          <a:noFill/>
+          <a:ln/>
+        </p:spPr>
+        <p:txBody>
+          <a:bodyPr wrap="square" rtlCol="0" anchor="ctr"/>
+          <a:lstStyle/>
+          <a:p>
+            <a:pPr marL="0" indent="0" algn="l">
+              <a:buNone/>
+            </a:pPr>
+            <a:r>
+              <a:rPr lang="en-US" sz="1800" dirty="0">
+                <a:solidFill>
+                  <a:srgbClr val="D9D9D9"/>
+                </a:solidFill>
+                <a:latin typeface="Roboto" pitchFamily="34" charset="0"/>
+                <a:ea typeface="Roboto" pitchFamily="34" charset="-122"/>
+                <a:cs typeface="Roboto" pitchFamily="34" charset="-120"/>
+              </a:rPr>
+              <a:t>Subtitle Subtitle Subtitle</a:t>
+            </a:r>
+            <a:endParaRPr lang="en-US" sz="1800" dirty="0"/>
+          </a:p>
+        </p:txBody>
+      </p:sp>
     </p:spTree>
   </p:cSld>
   <p:clrMapOvr>
@@ -793,197 +857,6 @@
 </file>
 
 <file path=ppt/slides/slide2.xml><?xml version="1.0" encoding="utf-8"?>
-<p:sld xmlns:a="http://schemas.openxmlformats.org/drawingml/2006/main" xmlns:r="http://schemas.openxmlformats.org/officeDocument/2006/relationships" xmlns:p="http://schemas.openxmlformats.org/presentationml/2006/main">
-  <p:cSld>
-    <p:spTree>
-      <p:nvGrpSpPr>
-        <p:cNvPr id="1" name=""/>
-        <p:cNvGrpSpPr/>
-        <p:nvPr/>
-      </p:nvGrpSpPr>
-      <p:grpSpPr>
-        <a:xfrm>
-          <a:off x="0" y="0"/>
-          <a:ext cx="0" cy="0"/>
-          <a:chOff x="0" y="0"/>
-          <a:chExt cx="0" cy="0"/>
-        </a:xfrm>
-      </p:grpSpPr>
-    </p:spTree>
-    <p:extLst>
-      <p:ext uri="{BB962C8B-B14F-4D97-AF65-F5344CB8AC3E}">
-        <p14:creationId xmlns:p14="http://schemas.microsoft.com/office/powerpoint/2010/main" val="1235615735"/>
-      </p:ext>
-    </p:extLst>
-  </p:cSld>
-  <p:clrMapOvr>
-    <a:masterClrMapping/>
-  </p:clrMapOvr>
-</p:sld>
-</file>
-
-<file path=ppt/slides/slide3.xml><?xml version="1.0" encoding="utf-8"?>
-<p:sld xmlns:a="http://schemas.openxmlformats.org/drawingml/2006/main" xmlns:r="http://schemas.openxmlformats.org/officeDocument/2006/relationships" xmlns:p="http://schemas.openxmlformats.org/presentationml/2006/main">
-  <p:cSld>
-    <p:spTree>
-      <p:nvGrpSpPr>
-        <p:cNvPr id="1" name=""/>
-        <p:cNvGrpSpPr/>
-        <p:nvPr/>
-      </p:nvGrpSpPr>
-      <p:grpSpPr>
-        <a:xfrm>
-          <a:off x="0" y="0"/>
-          <a:ext cx="0" cy="0"/>
-          <a:chOff x="0" y="0"/>
-          <a:chExt cx="0" cy="0"/>
-        </a:xfrm>
-      </p:grpSpPr>
-      <p:sp>
-        <p:nvSpPr>
-          <p:cNvPr id="2" name="TextBox 1">
-            <a:extLst>
-              <a:ext uri="{FF2B5EF4-FFF2-40B4-BE49-F238E27FC236}">
-                <a16:creationId xmlns:a16="http://schemas.microsoft.com/office/drawing/2014/main" id="{A3237BF3-B524-0F2F-72F7-8067F82671F4}"/>
-              </a:ext>
-            </a:extLst>
-          </p:cNvPr>
-          <p:cNvSpPr txBox="1"/>
-          <p:nvPr/>
-        </p:nvSpPr>
-        <p:spPr>
-          <a:xfrm>
-            <a:off x="124287" y="0"/>
-            <a:ext cx="8096200" cy="461665"/>
-          </a:xfrm>
-          <a:prstGeom prst="rect">
-            <a:avLst/>
-          </a:prstGeom>
-          <a:noFill/>
-        </p:spPr>
-        <p:txBody>
-          <a:bodyPr wrap="square" rtlCol="0">
-            <a:spAutoFit/>
-          </a:bodyPr>
-          <a:lstStyle/>
-          <a:p>
-            <a:r>
-              <a:rPr lang="en-VN" sz="2400" dirty="0">
-                <a:solidFill>
-                  <a:srgbClr val="305597"/>
-                </a:solidFill>
-                <a:latin typeface="Roboto" panose="02000000000000000000" pitchFamily="2" charset="0"/>
-                <a:ea typeface="Roboto" panose="02000000000000000000" pitchFamily="2" charset="0"/>
-                <a:cs typeface="Roboto" panose="02000000000000000000" pitchFamily="2" charset="0"/>
-              </a:rPr>
-              <a:t>Brand Introduction</a:t>
-            </a:r>
-          </a:p>
-        </p:txBody>
-      </p:sp>
-      <p:sp>
-        <p:nvSpPr>
-          <p:cNvPr id="3" name="TextBox 2">
-            <a:extLst>
-              <a:ext uri="{FF2B5EF4-FFF2-40B4-BE49-F238E27FC236}">
-                <a16:creationId xmlns:a16="http://schemas.microsoft.com/office/drawing/2014/main" id="{500C3252-EDA3-09A9-EC69-2658E73ED5C1}"/>
-              </a:ext>
-            </a:extLst>
-          </p:cNvPr>
-          <p:cNvSpPr txBox="1"/>
-          <p:nvPr/>
-        </p:nvSpPr>
-        <p:spPr>
-          <a:xfrm>
-            <a:off x="629788" y="1412373"/>
-            <a:ext cx="671979" cy="369332"/>
-          </a:xfrm>
-          <a:prstGeom prst="rect">
-            <a:avLst/>
-          </a:prstGeom>
-          <a:noFill/>
-        </p:spPr>
-        <p:txBody>
-          <a:bodyPr wrap="square" rtlCol="0">
-            <a:spAutoFit/>
-          </a:bodyPr>
-          <a:lstStyle/>
-          <a:p>
-            <a:r>
-              <a:rPr lang="en-VN" dirty="0"/>
-              <a:t>Hello</a:t>
-            </a:r>
-          </a:p>
-        </p:txBody>
-      </p:sp>
-      <p:sp>
-        <p:nvSpPr>
-          <p:cNvPr id="4" name="Rectangle 3">
-            <a:extLst>
-              <a:ext uri="{FF2B5EF4-FFF2-40B4-BE49-F238E27FC236}">
-                <a16:creationId xmlns:a16="http://schemas.microsoft.com/office/drawing/2014/main" id="{865B09FF-1984-D67A-16B2-34311291A334}"/>
-              </a:ext>
-            </a:extLst>
-          </p:cNvPr>
-          <p:cNvSpPr/>
-          <p:nvPr/>
-        </p:nvSpPr>
-        <p:spPr>
-          <a:xfrm>
-            <a:off x="1" y="0"/>
-            <a:ext cx="124286" cy="5282214"/>
-          </a:xfrm>
-          <a:prstGeom prst="rect">
-            <a:avLst/>
-          </a:prstGeom>
-          <a:solidFill>
-            <a:srgbClr val="305598"/>
-          </a:solidFill>
-          <a:ln>
-            <a:solidFill>
-              <a:srgbClr val="305598"/>
-            </a:solidFill>
-          </a:ln>
-        </p:spPr>
-        <p:style>
-          <a:lnRef idx="2">
-            <a:schemeClr val="accent1">
-              <a:shade val="15000"/>
-            </a:schemeClr>
-          </a:lnRef>
-          <a:fillRef idx="1">
-            <a:schemeClr val="accent1"/>
-          </a:fillRef>
-          <a:effectRef idx="0">
-            <a:schemeClr val="accent1"/>
-          </a:effectRef>
-          <a:fontRef idx="minor">
-            <a:schemeClr val="lt1"/>
-          </a:fontRef>
-        </p:style>
-        <p:txBody>
-          <a:bodyPr rtlCol="0" anchor="ctr"/>
-          <a:lstStyle/>
-          <a:p>
-            <a:pPr algn="ctr"/>
-            <a:endParaRPr lang="en-VN"/>
-          </a:p>
-        </p:txBody>
-      </p:sp>
-    </p:spTree>
-    <p:extLst>
-      <p:ext uri="{BB962C8B-B14F-4D97-AF65-F5344CB8AC3E}">
-        <p14:creationId xmlns:p14="http://schemas.microsoft.com/office/powerpoint/2010/main" val="2164056994"/>
-      </p:ext>
-    </p:extLst>
-  </p:cSld>
-  <p:clrMapOvr>
-    <a:masterClrMapping/>
-  </p:clrMapOvr>
-</p:sld>
-</file>
-
-<file path=ppt/slides/slide4.xml><?xml version="1.0" encoding="utf-8"?>
 <p:sld xmlns:a="http://schemas.openxmlformats.org/drawingml/2006/main" xmlns:r="http://schemas.openxmlformats.org/officeDocument/2006/relationships" xmlns:p="http://schemas.openxmlformats.org/presentationml/2006/main">
   <p:cSld name="Slide 2">
     <p:spTree>
@@ -1008,8 +881,8 @@
         </p:nvSpPr>
         <p:spPr>
           <a:xfrm>
-            <a:off x="0" y="0"/>
-            <a:ext cx="6858000" cy="0"/>
+            <a:off x="252000" y="0"/>
+            <a:ext cx="8280000" cy="720000"/>
           </a:xfrm>
           <a:prstGeom prst="rect">
             <a:avLst/>
@@ -1027,7 +900,7 @@
               <a:buNone/>
             </a:pPr>
             <a:r>
-              <a:rPr lang="en-US" sz="3200" b="1" dirty="0">
+              <a:rPr lang="en-US" b="1" dirty="0">
                 <a:solidFill>
                   <a:srgbClr val="305597"/>
                 </a:solidFill>
@@ -1037,7 +910,144 @@
               </a:rPr>
               <a:t>First Heading</a:t>
             </a:r>
-            <a:endParaRPr lang="en-US" sz="3200" dirty="0"/>
+            <a:endParaRPr lang="en-US" dirty="0"/>
+          </a:p>
+        </p:txBody>
+      </p:sp>
+      <p:sp>
+        <p:nvSpPr>
+          <p:cNvPr id="3" name="Shape 0">
+            <a:extLst>
+              <a:ext uri="{FF2B5EF4-FFF2-40B4-BE49-F238E27FC236}">
+                <a16:creationId xmlns:a16="http://schemas.microsoft.com/office/drawing/2014/main" id="{F842763B-1F77-D599-C132-25EBC827902A}"/>
+              </a:ext>
+            </a:extLst>
+          </p:cNvPr>
+          <p:cNvSpPr/>
+          <p:nvPr/>
+        </p:nvSpPr>
+        <p:spPr>
+          <a:xfrm>
+            <a:off x="0" y="0"/>
+            <a:ext cx="162000" cy="5144400"/>
+          </a:xfrm>
+          <a:prstGeom prst="rect">
+            <a:avLst/>
+          </a:prstGeom>
+          <a:solidFill>
+            <a:srgbClr val="305598"/>
+          </a:solidFill>
+          <a:ln>
+            <a:solidFill>
+              <a:schemeClr val="accent1"/>
+            </a:solidFill>
+          </a:ln>
+        </p:spPr>
+        <p:txBody>
+          <a:bodyPr/>
+          <a:lstStyle/>
+          <a:p>
+            <a:endParaRPr lang="en-VN"/>
+          </a:p>
+        </p:txBody>
+      </p:sp>
+      <p:sp>
+        <p:nvSpPr>
+          <p:cNvPr id="4" name="Text 0">
+            <a:extLst>
+              <a:ext uri="{FF2B5EF4-FFF2-40B4-BE49-F238E27FC236}">
+                <a16:creationId xmlns:a16="http://schemas.microsoft.com/office/drawing/2014/main" id="{16CF5AA5-12CD-6098-1BB9-6A88471BF7CC}"/>
+              </a:ext>
+            </a:extLst>
+          </p:cNvPr>
+          <p:cNvSpPr/>
+          <p:nvPr/>
+        </p:nvSpPr>
+        <p:spPr>
+          <a:xfrm>
+            <a:off x="252000" y="720000"/>
+            <a:ext cx="8280000" cy="3960000"/>
+          </a:xfrm>
+          <a:prstGeom prst="rect">
+            <a:avLst/>
+          </a:prstGeom>
+          <a:solidFill>
+            <a:srgbClr val="FFFFFF"/>
+          </a:solidFill>
+          <a:ln/>
+        </p:spPr>
+        <p:txBody>
+          <a:bodyPr wrap="square" rtlCol="0" anchor="t"/>
+          <a:lstStyle/>
+          <a:p>
+            <a:pPr marL="0" indent="0" algn="l">
+              <a:buNone/>
+            </a:pPr>
+            <a:r>
+              <a:rPr lang="en-US" sz="1200" dirty="0">
+                <a:solidFill>
+                  <a:srgbClr val="2D2C2C"/>
+                </a:solidFill>
+                <a:latin typeface="Roboto" pitchFamily="34" charset="0"/>
+                <a:ea typeface="Roboto" pitchFamily="34" charset="-122"/>
+                <a:cs typeface="Roboto" pitchFamily="34" charset="-120"/>
+              </a:rPr>
+              <a:t>Text</a:t>
+            </a:r>
+            <a:endParaRPr lang="en-US" sz="1200" dirty="0">
+              <a:solidFill>
+                <a:srgbClr val="2D2C2C"/>
+              </a:solidFill>
+            </a:endParaRPr>
+          </a:p>
+        </p:txBody>
+      </p:sp>
+      <p:sp>
+        <p:nvSpPr>
+          <p:cNvPr id="5" name="Text 0">
+            <a:extLst>
+              <a:ext uri="{FF2B5EF4-FFF2-40B4-BE49-F238E27FC236}">
+                <a16:creationId xmlns:a16="http://schemas.microsoft.com/office/drawing/2014/main" id="{775ECD0D-4F35-DD96-A742-D5B84A7E2E78}"/>
+              </a:ext>
+            </a:extLst>
+          </p:cNvPr>
+          <p:cNvSpPr/>
+          <p:nvPr/>
+        </p:nvSpPr>
+        <p:spPr>
+          <a:xfrm>
+            <a:off x="8755680" y="4829568"/>
+            <a:ext cx="252840" cy="221463"/>
+          </a:xfrm>
+          <a:prstGeom prst="rect">
+            <a:avLst/>
+          </a:prstGeom>
+          <a:noFill/>
+          <a:ln/>
+        </p:spPr>
+        <p:txBody>
+          <a:bodyPr wrap="square" rtlCol="0" anchor="t"/>
+          <a:lstStyle/>
+          <a:p>
+            <a:pPr marL="0" indent="0" algn="ctr">
+              <a:buNone/>
+            </a:pPr>
+            <a:r>
+              <a:rPr lang="en-US" sz="800" dirty="0">
+                <a:solidFill>
+                  <a:srgbClr val="D9D9D9"/>
+                </a:solidFill>
+                <a:latin typeface="Roboto" pitchFamily="34" charset="0"/>
+                <a:ea typeface="Roboto" pitchFamily="34" charset="-122"/>
+                <a:cs typeface="Roboto" pitchFamily="34" charset="-120"/>
+              </a:rPr>
+              <a:t>2</a:t>
+            </a:r>
+            <a:endParaRPr lang="en-US" sz="800" dirty="0">
+              <a:solidFill>
+                <a:srgbClr val="D9D9D9"/>
+              </a:solidFill>
+            </a:endParaRPr>
           </a:p>
         </p:txBody>
       </p:sp>

</xml_diff>